<commit_message>
Updated slides for presentation
</commit_message>
<xml_diff>
--- a/Analysis/Replication project - Final presentation.pptx
+++ b/Analysis/Replication project - Final presentation.pptx
@@ -11896,8 +11896,8 @@
         </p:nvSpPr>
         <p:spPr>
           <a:xfrm>
-            <a:off x="628650" y="1369225"/>
-            <a:ext cx="1867200" cy="1414200"/>
+            <a:off x="781050" y="1369225"/>
+            <a:ext cx="2232300" cy="1414200"/>
           </a:xfrm>
           <a:prstGeom prst="rect">
             <a:avLst/>
@@ -12422,7 +12422,7 @@
         <p:spPr>
           <a:xfrm>
             <a:off x="628650" y="932250"/>
-            <a:ext cx="4948500" cy="3328200"/>
+            <a:ext cx="4948500" cy="3755100"/>
           </a:xfrm>
           <a:prstGeom prst="rect">
             <a:avLst/>
@@ -12452,7 +12452,7 @@
             </a:r>
             <a:r>
               <a:rPr lang="en" sz="1400"/>
-              <a:t>A channel linking variation in attractiveness of locations and housing consumption in urban economies</a:t>
+              <a:t>A channel linking variation in attractiveness of locations versus housing consumption in urban economies</a:t>
             </a:r>
             <a:endParaRPr sz="1400"/>
           </a:p>
@@ -12498,7 +12498,11 @@
             </a:r>
             <a:r>
               <a:rPr lang="en" sz="1400"/>
-              <a:t>Develop a flexible approach to estimate the production function by treating quantity and price as latent variables and use value of housing per unit of land</a:t>
+              <a:t>Develop a flexible approach to estimate the </a:t>
+            </a:r>
+            <a:r>
+              <a:rPr lang="en" sz="1400"/>
+              <a:t>production function by treating quantity and price as latent variables</a:t>
             </a:r>
             <a:endParaRPr sz="1400"/>
           </a:p>
@@ -12516,42 +12520,68 @@
               <a:buNone/>
             </a:pPr>
             <a:r>
-              <a:rPr b="1" lang="en" sz="1400">
-                <a:solidFill>
-                  <a:srgbClr val="000000"/>
-                </a:solidFill>
-                <a:highlight>
-                  <a:srgbClr val="FFFFFF"/>
-                </a:highlight>
-              </a:rPr>
-              <a:t>Results : </a:t>
+              <a:rPr b="1" lang="en" sz="1400"/>
+              <a:t>Why replicate? </a:t>
             </a:r>
+            <a:endParaRPr b="1" sz="1400"/>
+          </a:p>
+          <a:p>
+            <a:pPr indent="-317500" lvl="0" marL="457200" rtl="0" algn="l">
+              <a:lnSpc>
+                <a:spcPct val="100000"/>
+              </a:lnSpc>
+              <a:spcBef>
+                <a:spcPts val="900"/>
+              </a:spcBef>
+              <a:spcAft>
+                <a:spcPts val="0"/>
+              </a:spcAft>
+              <a:buSzPts val="1400"/>
+              <a:buChar char="•"/>
+            </a:pPr>
             <a:r>
               <a:rPr lang="en" sz="1400"/>
-              <a:t>Estimated the supply and production functions for residential properties in Allegheny county, pennsylvania.</a:t>
+              <a:t>An interesting economic experiment</a:t>
             </a:r>
             <a:endParaRPr sz="1400"/>
           </a:p>
           <a:p>
-            <a:pPr indent="0" lvl="0" marL="0" rtl="0" algn="l">
+            <a:pPr indent="-317500" lvl="0" marL="457200" rtl="0" algn="l">
               <a:lnSpc>
                 <a:spcPct val="100000"/>
               </a:lnSpc>
               <a:spcBef>
-                <a:spcPts val="1000"/>
-              </a:spcBef>
-              <a:spcAft>
-                <a:spcPts val="0"/>
-              </a:spcAft>
-              <a:buNone/>
+                <a:spcPts val="0"/>
+              </a:spcBef>
+              <a:spcAft>
+                <a:spcPts val="0"/>
+              </a:spcAft>
+              <a:buSzPts val="1400"/>
+              <a:buChar char="•"/>
             </a:pPr>
             <a:r>
-              <a:rPr b="1" lang="en" sz="1400"/>
-              <a:t>Why replicate? </a:t>
+              <a:rPr lang="en" sz="1400"/>
+              <a:t>Highly cited and well documented</a:t>
             </a:r>
+            <a:endParaRPr sz="1400"/>
+          </a:p>
+          <a:p>
+            <a:pPr indent="-317500" lvl="0" marL="457200" rtl="0" algn="l">
+              <a:lnSpc>
+                <a:spcPct val="100000"/>
+              </a:lnSpc>
+              <a:spcBef>
+                <a:spcPts val="0"/>
+              </a:spcBef>
+              <a:spcAft>
+                <a:spcPts val="0"/>
+              </a:spcAft>
+              <a:buSzPts val="1400"/>
+              <a:buChar char="•"/>
+            </a:pPr>
             <a:r>
               <a:rPr lang="en" sz="1400"/>
-              <a:t>An interesting economic experiment that helps us to understand how price of a land and value of housing are related in estimating the supply and production functions.</a:t>
+              <a:t>Use of regression models for the estimation</a:t>
             </a:r>
             <a:endParaRPr sz="1400"/>
           </a:p>
@@ -12829,7 +12859,7 @@
         <p:spPr>
           <a:xfrm>
             <a:off x="628650" y="841500"/>
-            <a:ext cx="7772400" cy="1990800"/>
+            <a:ext cx="7772400" cy="2208900"/>
           </a:xfrm>
           <a:prstGeom prst="rect">
             <a:avLst/>
@@ -12846,7 +12876,7 @@
                 <a:spcPct val="100000"/>
               </a:lnSpc>
               <a:spcBef>
-                <a:spcPts val="900"/>
+                <a:spcPts val="0"/>
               </a:spcBef>
               <a:spcAft>
                 <a:spcPts val="0"/>
@@ -12856,7 +12886,7 @@
             <a:r>
               <a:rPr b="1" lang="en" sz="1400">
                 <a:solidFill>
-                  <a:srgbClr val="24292E"/>
+                  <a:srgbClr val="000000"/>
                 </a:solidFill>
                 <a:highlight>
                   <a:srgbClr val="FFFFFF"/>
@@ -12867,7 +12897,7 @@
             <a:r>
               <a:rPr lang="en" sz="1400">
                 <a:solidFill>
-                  <a:srgbClr val="24292E"/>
+                  <a:srgbClr val="000000"/>
                 </a:solidFill>
                 <a:highlight>
                   <a:srgbClr val="FFFFFF"/>
@@ -12878,7 +12908,7 @@
             <a:r>
               <a:rPr i="1" lang="en" sz="1400">
                 <a:solidFill>
-                  <a:srgbClr val="24292E"/>
+                  <a:srgbClr val="000000"/>
                 </a:solidFill>
                 <a:highlight>
                   <a:srgbClr val="FFFFFF"/>
@@ -12889,7 +12919,7 @@
             <a:r>
               <a:rPr lang="en" sz="1400">
                 <a:solidFill>
-                  <a:srgbClr val="24292E"/>
+                  <a:srgbClr val="000000"/>
                 </a:solidFill>
                 <a:highlight>
                   <a:srgbClr val="FFFFFF"/>
@@ -12899,7 +12929,7 @@
             </a:r>
             <a:endParaRPr sz="1400">
               <a:solidFill>
-                <a:srgbClr val="24292E"/>
+                <a:srgbClr val="000000"/>
               </a:solidFill>
               <a:highlight>
                 <a:srgbClr val="FFFFFF"/>
@@ -12912,7 +12942,32 @@
                 <a:spcPct val="100000"/>
               </a:lnSpc>
               <a:spcBef>
-                <a:spcPts val="900"/>
+                <a:spcPts val="0"/>
+              </a:spcBef>
+              <a:spcAft>
+                <a:spcPts val="0"/>
+              </a:spcAft>
+              <a:buNone/>
+            </a:pPr>
+            <a:r>
+              <a:t/>
+            </a:r>
+            <a:endParaRPr b="1" sz="1400">
+              <a:solidFill>
+                <a:srgbClr val="000000"/>
+              </a:solidFill>
+              <a:highlight>
+                <a:srgbClr val="FFFFFF"/>
+              </a:highlight>
+            </a:endParaRPr>
+          </a:p>
+          <a:p>
+            <a:pPr indent="0" lvl="0" marL="0" rtl="0" algn="l">
+              <a:lnSpc>
+                <a:spcPct val="100000"/>
+              </a:lnSpc>
+              <a:spcBef>
+                <a:spcPts val="0"/>
               </a:spcBef>
               <a:spcAft>
                 <a:spcPts val="0"/>
@@ -12922,17 +12977,17 @@
             <a:r>
               <a:rPr b="1" lang="en" sz="1400">
                 <a:solidFill>
-                  <a:srgbClr val="24292E"/>
+                  <a:srgbClr val="000000"/>
                 </a:solidFill>
                 <a:highlight>
                   <a:srgbClr val="FFFFFF"/>
                 </a:highlight>
               </a:rPr>
-              <a:t>Method : </a:t>
+              <a:t>Methods : </a:t>
             </a:r>
             <a:endParaRPr b="1" sz="1400">
               <a:solidFill>
-                <a:srgbClr val="24292E"/>
+                <a:srgbClr val="000000"/>
               </a:solidFill>
               <a:highlight>
                 <a:srgbClr val="FFFFFF"/>
@@ -12945,13 +13000,13 @@
                 <a:spcPct val="100000"/>
               </a:lnSpc>
               <a:spcBef>
-                <a:spcPts val="900"/>
-              </a:spcBef>
-              <a:spcAft>
-                <a:spcPts val="0"/>
-              </a:spcAft>
-              <a:buClr>
-                <a:srgbClr val="24292E"/>
+                <a:spcPts val="0"/>
+              </a:spcBef>
+              <a:spcAft>
+                <a:spcPts val="0"/>
+              </a:spcAft>
+              <a:buClr>
+                <a:srgbClr val="000000"/>
               </a:buClr>
               <a:buSzPts val="1400"/>
               <a:buChar char="•"/>
@@ -12959,7 +13014,7 @@
             <a:r>
               <a:rPr lang="en" sz="1400">
                 <a:solidFill>
-                  <a:srgbClr val="24292E"/>
+                  <a:srgbClr val="000000"/>
                 </a:solidFill>
                 <a:highlight>
                   <a:srgbClr val="FFFFFF"/>
@@ -12969,7 +13024,7 @@
             </a:r>
             <a:endParaRPr sz="1400">
               <a:solidFill>
-                <a:srgbClr val="24292E"/>
+                <a:srgbClr val="000000"/>
               </a:solidFill>
               <a:highlight>
                 <a:srgbClr val="FFFFFF"/>
@@ -12988,7 +13043,7 @@
                 <a:spcPts val="0"/>
               </a:spcAft>
               <a:buClr>
-                <a:srgbClr val="24292E"/>
+                <a:srgbClr val="000000"/>
               </a:buClr>
               <a:buSzPts val="1400"/>
               <a:buChar char="•"/>
@@ -12996,7 +13051,7 @@
             <a:r>
               <a:rPr lang="en" sz="1400">
                 <a:solidFill>
-                  <a:srgbClr val="24292E"/>
+                  <a:srgbClr val="000000"/>
                 </a:solidFill>
                 <a:highlight>
                   <a:srgbClr val="FFFFFF"/>
@@ -13006,7 +13061,7 @@
             </a:r>
             <a:endParaRPr sz="1400">
               <a:solidFill>
-                <a:srgbClr val="24292E"/>
+                <a:srgbClr val="000000"/>
               </a:solidFill>
               <a:highlight>
                 <a:srgbClr val="FFFFFF"/>
@@ -13015,8 +13070,74 @@
           </a:p>
           <a:p>
             <a:pPr indent="0" lvl="0" marL="0" rtl="0" algn="l">
-              <a:spcBef>
-                <a:spcPts val="900"/>
+              <a:lnSpc>
+                <a:spcPct val="100000"/>
+              </a:lnSpc>
+              <a:spcBef>
+                <a:spcPts val="0"/>
+              </a:spcBef>
+              <a:spcAft>
+                <a:spcPts val="0"/>
+              </a:spcAft>
+              <a:buNone/>
+            </a:pPr>
+            <a:r>
+              <a:t/>
+            </a:r>
+            <a:endParaRPr b="1" sz="700">
+              <a:solidFill>
+                <a:srgbClr val="000000"/>
+              </a:solidFill>
+              <a:highlight>
+                <a:schemeClr val="lt1"/>
+              </a:highlight>
+            </a:endParaRPr>
+          </a:p>
+          <a:p>
+            <a:pPr indent="0" lvl="0" marL="0" rtl="0" algn="l">
+              <a:lnSpc>
+                <a:spcPct val="100000"/>
+              </a:lnSpc>
+              <a:spcBef>
+                <a:spcPts val="1000"/>
+              </a:spcBef>
+              <a:spcAft>
+                <a:spcPts val="0"/>
+              </a:spcAft>
+              <a:buNone/>
+            </a:pPr>
+            <a:r>
+              <a:rPr b="1" lang="en" sz="1400">
+                <a:solidFill>
+                  <a:srgbClr val="000000"/>
+                </a:solidFill>
+                <a:highlight>
+                  <a:schemeClr val="lt1"/>
+                </a:highlight>
+              </a:rPr>
+              <a:t>Results : </a:t>
+            </a:r>
+            <a:r>
+              <a:rPr lang="en" sz="1400">
+                <a:solidFill>
+                  <a:srgbClr val="000000"/>
+                </a:solidFill>
+              </a:rPr>
+              <a:t>Estimated the supply and production functions for residential properties in Allegheny county, Pennsylvania, along with 95% CI</a:t>
+            </a:r>
+            <a:endParaRPr sz="1400">
+              <a:solidFill>
+                <a:srgbClr val="000000"/>
+              </a:solidFill>
+              <a:highlight>
+                <a:srgbClr val="FFFFFF"/>
+              </a:highlight>
+            </a:endParaRPr>
+          </a:p>
+          <a:p>
+            <a:pPr indent="0" lvl="0" marL="0" rtl="0" algn="l">
+              <a:spcBef>
+                <a:spcPts val="1000"/>
               </a:spcBef>
               <a:spcAft>
                 <a:spcPts val="0"/>
@@ -13120,8 +13241,8 @@
         </p:blipFill>
         <p:spPr>
           <a:xfrm>
-            <a:off x="5428700" y="2452200"/>
-            <a:ext cx="3086651" cy="1990800"/>
+            <a:off x="5979150" y="2894650"/>
+            <a:ext cx="2369266" cy="1776950"/>
           </a:xfrm>
           <a:prstGeom prst="rect">
             <a:avLst/>
@@ -13142,8 +13263,8 @@
         </p:nvSpPr>
         <p:spPr>
           <a:xfrm>
-            <a:off x="468800" y="2666050"/>
-            <a:ext cx="5185500" cy="2375100"/>
+            <a:off x="578250" y="3035650"/>
+            <a:ext cx="5400900" cy="1776900"/>
           </a:xfrm>
           <a:prstGeom prst="rect">
             <a:avLst/>
@@ -13176,7 +13297,18 @@
                   <a:srgbClr val="FFFFFF"/>
                 </a:highlight>
               </a:rPr>
-              <a:t>Replication variant:</a:t>
+              <a:t>Technical </a:t>
+            </a:r>
+            <a:r>
+              <a:rPr b="1" lang="en" sz="1400">
+                <a:solidFill>
+                  <a:srgbClr val="24292E"/>
+                </a:solidFill>
+                <a:highlight>
+                  <a:srgbClr val="FFFFFF"/>
+                </a:highlight>
+              </a:rPr>
+              <a:t>variants in our replication:</a:t>
             </a:r>
             <a:endParaRPr sz="1400"/>
           </a:p>
@@ -13255,15 +13387,7 @@
             </a:pPr>
             <a:r>
               <a:rPr lang="en" sz="1400"/>
-              <a:t>Replicated the plots of 95% CI </a:t>
-            </a:r>
-            <a:r>
-              <a:rPr lang="en" sz="1400"/>
-              <a:t>bands for supply and production function estimates </a:t>
-            </a:r>
-            <a:r>
-              <a:rPr lang="en" sz="1400"/>
-              <a:t>for the GLM log-linear model</a:t>
+              <a:t>Confidence interval bands for GLM log-linear model</a:t>
             </a:r>
             <a:endParaRPr sz="1400"/>
           </a:p>
@@ -13322,7 +13446,7 @@
         </p:nvSpPr>
         <p:spPr>
           <a:xfrm>
-            <a:off x="5850000" y="4462100"/>
+            <a:off x="5850000" y="4538300"/>
             <a:ext cx="2968500" cy="423600"/>
           </a:xfrm>
           <a:prstGeom prst="rect">
@@ -13678,7 +13802,7 @@
             </a:pPr>
             <a:r>
               <a:rPr lang="en" sz="2400"/>
-              <a:t>Replicating regression model and estimates</a:t>
+              <a:t>Replication - Regression model and estimates</a:t>
             </a:r>
             <a:endParaRPr sz="2400"/>
           </a:p>
@@ -14062,7 +14186,7 @@
             </a:pPr>
             <a:r>
               <a:rPr lang="en" sz="2400"/>
-              <a:t>Supply and Production functions for OLS and Kernel models</a:t>
+              <a:t>Replication - Supply and Production functions </a:t>
             </a:r>
             <a:endParaRPr sz="2400"/>
           </a:p>
@@ -14416,7 +14540,7 @@
             </a:pPr>
             <a:r>
               <a:rPr lang="en" sz="2400"/>
-              <a:t>Supply function for GLM with 95% confidence interval</a:t>
+              <a:t>Replication - Supply function for GLM with 95% confidence interval</a:t>
             </a:r>
             <a:endParaRPr sz="2400"/>
           </a:p>
@@ -14719,7 +14843,7 @@
             </a:pPr>
             <a:r>
               <a:rPr lang="en" sz="2400"/>
-              <a:t>Production </a:t>
+              <a:t>Replication - Production </a:t>
             </a:r>
             <a:r>
               <a:rPr lang="en" sz="2400"/>
@@ -15164,10 +15288,10 @@
               <a:buNone/>
             </a:pPr>
             <a:r>
-              <a:rPr lang="en" sz="2800"/>
+              <a:rPr lang="en" sz="2400"/>
               <a:t>Reflections</a:t>
             </a:r>
-            <a:endParaRPr sz="2800"/>
+            <a:endParaRPr sz="2400"/>
           </a:p>
         </p:txBody>
       </p:sp>

</xml_diff>